<commit_message>
change RL design matrices and remove all_stims folder
</commit_message>
<xml_diff>
--- a/tools/fMRIDirections.pptx
+++ b/tools/fMRIDirections.pptx
@@ -2377,7 +2377,7 @@
           </a:ln>
           <a:extLst>
             <a:ext uri="{C572A759-6A51-4108-AA02-DFA0A04FC94B}">
-              <ma14:wrappingTextBoxFlag xmlns="" xmlns:m="http://schemas.openxmlformats.org/officeDocument/2006/math" xmlns:a14="http://schemas.microsoft.com/office/drawing/2010/main" xmlns:ma14="http://schemas.microsoft.com/office/mac/drawingml/2011/main" val="1"/>
+              <ma14:wrappingTextBoxFlag xmlns:ma14="http://schemas.microsoft.com/office/mac/drawingml/2011/main" xmlns:a14="http://schemas.microsoft.com/office/drawing/2010/main" xmlns:m="http://schemas.openxmlformats.org/officeDocument/2006/math" xmlns="" val="1"/>
             </a:ext>
           </a:extLst>
         </p:spPr>
@@ -2416,7 +2416,7 @@
           </a:ln>
           <a:extLst>
             <a:ext uri="{C572A759-6A51-4108-AA02-DFA0A04FC94B}">
-              <ma14:wrappingTextBoxFlag xmlns="" xmlns:m="http://schemas.openxmlformats.org/officeDocument/2006/math" xmlns:a14="http://schemas.microsoft.com/office/drawing/2010/main" xmlns:ma14="http://schemas.microsoft.com/office/mac/drawingml/2011/main" val="1"/>
+              <ma14:wrappingTextBoxFlag xmlns:ma14="http://schemas.microsoft.com/office/mac/drawingml/2011/main" xmlns:a14="http://schemas.microsoft.com/office/drawing/2010/main" xmlns:m="http://schemas.openxmlformats.org/officeDocument/2006/math" xmlns="" val="1"/>
             </a:ext>
           </a:extLst>
         </p:spPr>
@@ -4759,7 +4759,7 @@
             <a:noFill/>
             <a:extLst>
               <a:ext uri="{909E8E84-426E-40dd-AFC4-6F175D3DCCD1}">
-                <a14:hiddenFill xmlns="" xmlns:a14="http://schemas.microsoft.com/office/drawing/2010/main">
+                <a14:hiddenFill xmlns:a14="http://schemas.microsoft.com/office/drawing/2010/main" xmlns="">
                   <a:solidFill>
                     <a:srgbClr val="FFFFFF"/>
                   </a:solidFill>
@@ -5000,7 +5000,7 @@
             </a:pPr>
             <a:r>
               <a:rPr lang="en-US" sz="3500" dirty="0"/>
-              <a:t>If you are too slow, you will see </a:t>
+              <a:t>If you are too slow to respond, you will see </a:t>
             </a:r>
           </a:p>
           <a:p>
@@ -5017,7 +5017,7 @@
             </a:r>
             <a:r>
               <a:rPr lang="en-US" sz="3500" i="1" dirty="0"/>
-              <a:t>Please respond more quickly</a:t>
+              <a:t>TOO SLOW</a:t>
             </a:r>
             <a:r>
               <a:rPr lang="en-US" sz="3500" dirty="0"/>
@@ -5062,7 +5062,7 @@
             <a:effectLst/>
             <a:extLst>
               <a:ext uri="{C572A759-6A51-4108-AA02-DFA0A04FC94B}">
-                <ma14:wrappingTextBoxFlag xmlns="" xmlns:m="http://schemas.openxmlformats.org/officeDocument/2006/math" xmlns:a14="http://schemas.microsoft.com/office/drawing/2010/main" xmlns:ma14="http://schemas.microsoft.com/office/mac/drawingml/2011/main" val="1"/>
+                <ma14:wrappingTextBoxFlag xmlns:ma14="http://schemas.microsoft.com/office/mac/drawingml/2011/main" xmlns:a14="http://schemas.microsoft.com/office/drawing/2010/main" xmlns:m="http://schemas.openxmlformats.org/officeDocument/2006/math" xmlns="" val="1"/>
               </a:ext>
             </a:extLst>
           </p:spPr>
@@ -5139,7 +5139,7 @@
             <a:effectLst/>
             <a:extLst>
               <a:ext uri="{C572A759-6A51-4108-AA02-DFA0A04FC94B}">
-                <ma14:wrappingTextBoxFlag xmlns="" xmlns:m="http://schemas.openxmlformats.org/officeDocument/2006/math" xmlns:a14="http://schemas.microsoft.com/office/drawing/2010/main" xmlns:ma14="http://schemas.microsoft.com/office/mac/drawingml/2011/main" val="1"/>
+                <ma14:wrappingTextBoxFlag xmlns:ma14="http://schemas.microsoft.com/office/mac/drawingml/2011/main" xmlns:a14="http://schemas.microsoft.com/office/drawing/2010/main" xmlns:m="http://schemas.openxmlformats.org/officeDocument/2006/math" xmlns="" val="1"/>
               </a:ext>
             </a:extLst>
           </p:spPr>
@@ -5893,7 +5893,7 @@
             <a:noFill/>
             <a:extLst>
               <a:ext uri="{909E8E84-426E-40dd-AFC4-6F175D3DCCD1}">
-                <a14:hiddenFill xmlns="" xmlns:a14="http://schemas.microsoft.com/office/drawing/2010/main">
+                <a14:hiddenFill xmlns:a14="http://schemas.microsoft.com/office/drawing/2010/main" xmlns="">
                   <a:solidFill>
                     <a:srgbClr val="FFFFFF"/>
                   </a:solidFill>
@@ -9017,7 +9017,7 @@
             </a:pPr>
             <a:r>
               <a:rPr lang="en-US" sz="3500" dirty="0"/>
-              <a:t>If you are too slow, you will see </a:t>
+              <a:t>If you are too slow to respond, you will see </a:t>
             </a:r>
           </a:p>
           <a:p>
@@ -9034,7 +9034,7 @@
             </a:r>
             <a:r>
               <a:rPr lang="en-US" sz="3500" i="1" dirty="0"/>
-              <a:t>Please respond more quickly</a:t>
+              <a:t>TOO SLOW</a:t>
             </a:r>
             <a:r>
               <a:rPr lang="en-US" sz="3500" dirty="0"/>
@@ -9079,7 +9079,7 @@
             <a:effectLst/>
             <a:extLst>
               <a:ext uri="{C572A759-6A51-4108-AA02-DFA0A04FC94B}">
-                <ma14:wrappingTextBoxFlag xmlns="" xmlns:m="http://schemas.openxmlformats.org/officeDocument/2006/math" xmlns:a14="http://schemas.microsoft.com/office/drawing/2010/main" xmlns:ma14="http://schemas.microsoft.com/office/mac/drawingml/2011/main" val="1"/>
+                <ma14:wrappingTextBoxFlag xmlns:ma14="http://schemas.microsoft.com/office/mac/drawingml/2011/main" xmlns:a14="http://schemas.microsoft.com/office/drawing/2010/main" xmlns:m="http://schemas.openxmlformats.org/officeDocument/2006/math" xmlns="" val="1"/>
               </a:ext>
             </a:extLst>
           </p:spPr>
@@ -9156,7 +9156,7 @@
             <a:effectLst/>
             <a:extLst>
               <a:ext uri="{C572A759-6A51-4108-AA02-DFA0A04FC94B}">
-                <ma14:wrappingTextBoxFlag xmlns="" xmlns:m="http://schemas.openxmlformats.org/officeDocument/2006/math" xmlns:a14="http://schemas.microsoft.com/office/drawing/2010/main" xmlns:ma14="http://schemas.microsoft.com/office/mac/drawingml/2011/main" val="1"/>
+                <ma14:wrappingTextBoxFlag xmlns:ma14="http://schemas.microsoft.com/office/mac/drawingml/2011/main" xmlns:a14="http://schemas.microsoft.com/office/drawing/2010/main" xmlns:m="http://schemas.openxmlformats.org/officeDocument/2006/math" xmlns="" val="1"/>
               </a:ext>
             </a:extLst>
           </p:spPr>
@@ -10643,7 +10643,7 @@
               <a:noFill/>
               <a:extLst>
                 <a:ext uri="{909E8E84-426E-40dd-AFC4-6F175D3DCCD1}">
-                  <a14:hiddenFill xmlns="" xmlns:a14="http://schemas.microsoft.com/office/drawing/2010/main">
+                  <a14:hiddenFill xmlns:a14="http://schemas.microsoft.com/office/drawing/2010/main" xmlns="">
                     <a:solidFill>
                       <a:srgbClr val="FFFFFF"/>
                     </a:solidFill>
@@ -11243,7 +11243,7 @@
             </a:ln>
             <a:extLst>
               <a:ext uri="{C572A759-6A51-4108-AA02-DFA0A04FC94B}">
-                <ma14:wrappingTextBoxFlag xmlns="" xmlns:m="http://schemas.openxmlformats.org/officeDocument/2006/math" xmlns:a14="http://schemas.microsoft.com/office/drawing/2010/main" xmlns:ma14="http://schemas.microsoft.com/office/mac/drawingml/2011/main" val="1"/>
+                <ma14:wrappingTextBoxFlag xmlns:ma14="http://schemas.microsoft.com/office/mac/drawingml/2011/main" xmlns:a14="http://schemas.microsoft.com/office/drawing/2010/main" xmlns:m="http://schemas.openxmlformats.org/officeDocument/2006/math" xmlns="" val="1"/>
               </a:ext>
             </a:extLst>
           </p:spPr>
@@ -11612,7 +11612,7 @@
               <a:noFill/>
               <a:extLst>
                 <a:ext uri="{909E8E84-426E-40dd-AFC4-6F175D3DCCD1}">
-                  <a14:hiddenFill xmlns="" xmlns:a14="http://schemas.microsoft.com/office/drawing/2010/main">
+                  <a14:hiddenFill xmlns:a14="http://schemas.microsoft.com/office/drawing/2010/main" xmlns="">
                     <a:solidFill>
                       <a:srgbClr val="FFFFFF"/>
                     </a:solidFill>
@@ -12217,7 +12217,7 @@
             </a:ln>
             <a:extLst>
               <a:ext uri="{C572A759-6A51-4108-AA02-DFA0A04FC94B}">
-                <ma14:wrappingTextBoxFlag xmlns="" xmlns:m="http://schemas.openxmlformats.org/officeDocument/2006/math" xmlns:a14="http://schemas.microsoft.com/office/drawing/2010/main" xmlns:ma14="http://schemas.microsoft.com/office/mac/drawingml/2011/main" val="1"/>
+                <ma14:wrappingTextBoxFlag xmlns:ma14="http://schemas.microsoft.com/office/mac/drawingml/2011/main" xmlns:a14="http://schemas.microsoft.com/office/drawing/2010/main" xmlns:m="http://schemas.openxmlformats.org/officeDocument/2006/math" xmlns="" val="1"/>
               </a:ext>
             </a:extLst>
           </p:spPr>
@@ -12573,7 +12573,7 @@
               <a:noFill/>
               <a:extLst>
                 <a:ext uri="{909E8E84-426E-40dd-AFC4-6F175D3DCCD1}">
-                  <a14:hiddenFill xmlns="" xmlns:a14="http://schemas.microsoft.com/office/drawing/2010/main">
+                  <a14:hiddenFill xmlns:a14="http://schemas.microsoft.com/office/drawing/2010/main" xmlns="">
                     <a:solidFill>
                       <a:srgbClr val="FFFFFF"/>
                     </a:solidFill>
@@ -13739,7 +13739,7 @@
             <a:noFill/>
             <a:extLst>
               <a:ext uri="{909E8E84-426E-40dd-AFC4-6F175D3DCCD1}">
-                <a14:hiddenFill xmlns="" xmlns:a14="http://schemas.microsoft.com/office/drawing/2010/main">
+                <a14:hiddenFill xmlns:a14="http://schemas.microsoft.com/office/drawing/2010/main" xmlns="">
                   <a:solidFill>
                     <a:srgbClr val="FFFFFF"/>
                   </a:solidFill>
@@ -13900,7 +13900,7 @@
             </a:ln>
             <a:extLst>
               <a:ext uri="{C572A759-6A51-4108-AA02-DFA0A04FC94B}">
-                <ma14:wrappingTextBoxFlag xmlns="" xmlns:m="http://schemas.openxmlformats.org/officeDocument/2006/math" xmlns:a14="http://schemas.microsoft.com/office/drawing/2010/main" xmlns:ma14="http://schemas.microsoft.com/office/mac/drawingml/2011/main" val="1"/>
+                <ma14:wrappingTextBoxFlag xmlns:ma14="http://schemas.microsoft.com/office/mac/drawingml/2011/main" xmlns:a14="http://schemas.microsoft.com/office/drawing/2010/main" xmlns:m="http://schemas.openxmlformats.org/officeDocument/2006/math" xmlns="" val="1"/>
               </a:ext>
             </a:extLst>
           </p:spPr>
@@ -16178,7 +16178,7 @@
               <a:noFill/>
               <a:extLst>
                 <a:ext uri="{909E8E84-426E-40dd-AFC4-6F175D3DCCD1}">
-                  <a14:hiddenFill xmlns="" xmlns:a14="http://schemas.microsoft.com/office/drawing/2010/main">
+                  <a14:hiddenFill xmlns:a14="http://schemas.microsoft.com/office/drawing/2010/main" xmlns="">
                     <a:solidFill>
                       <a:srgbClr val="FFFFFF"/>
                     </a:solidFill>
@@ -17350,7 +17350,7 @@
             <a:noFill/>
             <a:extLst>
               <a:ext uri="{909E8E84-426E-40dd-AFC4-6F175D3DCCD1}">
-                <a14:hiddenFill xmlns="" xmlns:a14="http://schemas.microsoft.com/office/drawing/2010/main">
+                <a14:hiddenFill xmlns:a14="http://schemas.microsoft.com/office/drawing/2010/main" xmlns="">
                   <a:solidFill>
                     <a:srgbClr val="FFFFFF"/>
                   </a:solidFill>
@@ -18050,7 +18050,7 @@
             <a:noFill/>
             <a:extLst>
               <a:ext uri="{909E8E84-426E-40dd-AFC4-6F175D3DCCD1}">
-                <a14:hiddenFill xmlns="" xmlns:a14="http://schemas.microsoft.com/office/drawing/2010/main">
+                <a14:hiddenFill xmlns:a14="http://schemas.microsoft.com/office/drawing/2010/main" xmlns="">
                   <a:solidFill>
                     <a:srgbClr val="FFFFFF"/>
                   </a:solidFill>
@@ -18304,7 +18304,7 @@
             </a:pPr>
             <a:r>
               <a:rPr lang="en-US" sz="3500" dirty="0"/>
-              <a:t>If you are too slow, you will see </a:t>
+              <a:t>If you are too slow to respond, you will see </a:t>
             </a:r>
           </a:p>
           <a:p>
@@ -18321,7 +18321,7 @@
             </a:r>
             <a:r>
               <a:rPr lang="en-US" sz="3500" i="1" dirty="0"/>
-              <a:t>Please respond more quickly</a:t>
+              <a:t>TOO SLOW</a:t>
             </a:r>
             <a:r>
               <a:rPr lang="en-US" sz="3500" dirty="0"/>
@@ -18958,7 +18958,7 @@
             <a:noFill/>
             <a:extLst>
               <a:ext uri="{909E8E84-426E-40dd-AFC4-6F175D3DCCD1}">
-                <a14:hiddenFill xmlns="" xmlns:a14="http://schemas.microsoft.com/office/drawing/2010/main">
+                <a14:hiddenFill xmlns:a14="http://schemas.microsoft.com/office/drawing/2010/main" xmlns="">
                   <a:solidFill>
                     <a:srgbClr val="FFFFFF"/>
                   </a:solidFill>
@@ -22095,7 +22095,7 @@
             </a:pPr>
             <a:r>
               <a:rPr lang="en-US" sz="3500" dirty="0"/>
-              <a:t>If you are too slow, you will see </a:t>
+              <a:t>If you are too slow to respond, you will see </a:t>
             </a:r>
           </a:p>
           <a:p>
@@ -22112,7 +22112,7 @@
             </a:r>
             <a:r>
               <a:rPr lang="en-US" sz="3500" i="1" dirty="0"/>
-              <a:t>Please respond more quickly</a:t>
+              <a:t>TOO SLOW</a:t>
             </a:r>
             <a:r>
               <a:rPr lang="en-US" sz="3500" dirty="0"/>
@@ -22682,7 +22682,7 @@
           </a:ln>
           <a:extLst>
             <a:ext uri="{C572A759-6A51-4108-AA02-DFA0A04FC94B}">
-              <ma14:wrappingTextBoxFlag xmlns="" xmlns:m="http://schemas.openxmlformats.org/officeDocument/2006/math" xmlns:a14="http://schemas.microsoft.com/office/drawing/2010/main" xmlns:ma14="http://schemas.microsoft.com/office/mac/drawingml/2011/main" val="1"/>
+              <ma14:wrappingTextBoxFlag xmlns:ma14="http://schemas.microsoft.com/office/mac/drawingml/2011/main" xmlns:a14="http://schemas.microsoft.com/office/drawing/2010/main" xmlns:m="http://schemas.openxmlformats.org/officeDocument/2006/math" xmlns="" val="1"/>
             </a:ext>
           </a:extLst>
         </p:spPr>
@@ -22759,7 +22759,7 @@
           </a:ln>
           <a:extLst>
             <a:ext uri="{C572A759-6A51-4108-AA02-DFA0A04FC94B}">
-              <ma14:wrappingTextBoxFlag xmlns="" xmlns:m="http://schemas.openxmlformats.org/officeDocument/2006/math" xmlns:a14="http://schemas.microsoft.com/office/drawing/2010/main" xmlns:ma14="http://schemas.microsoft.com/office/mac/drawingml/2011/main" val="1"/>
+              <ma14:wrappingTextBoxFlag xmlns:ma14="http://schemas.microsoft.com/office/mac/drawingml/2011/main" xmlns:a14="http://schemas.microsoft.com/office/drawing/2010/main" xmlns:m="http://schemas.openxmlformats.org/officeDocument/2006/math" xmlns="" val="1"/>
             </a:ext>
           </a:extLst>
         </p:spPr>
@@ -22853,7 +22853,7 @@
           </a:ln>
           <a:extLst>
             <a:ext uri="{C572A759-6A51-4108-AA02-DFA0A04FC94B}">
-              <ma14:wrappingTextBoxFlag xmlns="" xmlns:m="http://schemas.openxmlformats.org/officeDocument/2006/math" xmlns:a14="http://schemas.microsoft.com/office/drawing/2010/main" xmlns:ma14="http://schemas.microsoft.com/office/mac/drawingml/2011/main" val="1"/>
+              <ma14:wrappingTextBoxFlag xmlns:ma14="http://schemas.microsoft.com/office/mac/drawingml/2011/main" xmlns:a14="http://schemas.microsoft.com/office/drawing/2010/main" xmlns:m="http://schemas.openxmlformats.org/officeDocument/2006/math" xmlns="" val="1"/>
             </a:ext>
           </a:extLst>
         </p:spPr>
@@ -23239,7 +23239,7 @@
             <a:effectLst/>
             <a:extLst>
               <a:ext uri="{C572A759-6A51-4108-AA02-DFA0A04FC94B}">
-                <ma14:wrappingTextBoxFlag xmlns="" xmlns:m="http://schemas.openxmlformats.org/officeDocument/2006/math" xmlns:a14="http://schemas.microsoft.com/office/drawing/2010/main" xmlns:ma14="http://schemas.microsoft.com/office/mac/drawingml/2011/main" val="1"/>
+                <ma14:wrappingTextBoxFlag xmlns:ma14="http://schemas.microsoft.com/office/mac/drawingml/2011/main" xmlns:a14="http://schemas.microsoft.com/office/drawing/2010/main" xmlns:m="http://schemas.openxmlformats.org/officeDocument/2006/math" xmlns="" val="1"/>
               </a:ext>
             </a:extLst>
           </p:spPr>
@@ -23322,7 +23322,7 @@
             <a:effectLst/>
             <a:extLst>
               <a:ext uri="{C572A759-6A51-4108-AA02-DFA0A04FC94B}">
-                <ma14:wrappingTextBoxFlag xmlns="" xmlns:m="http://schemas.openxmlformats.org/officeDocument/2006/math" xmlns:a14="http://schemas.microsoft.com/office/drawing/2010/main" xmlns:ma14="http://schemas.microsoft.com/office/mac/drawingml/2011/main" val="1"/>
+                <ma14:wrappingTextBoxFlag xmlns:ma14="http://schemas.microsoft.com/office/mac/drawingml/2011/main" xmlns:a14="http://schemas.microsoft.com/office/drawing/2010/main" xmlns:m="http://schemas.openxmlformats.org/officeDocument/2006/math" xmlns="" val="1"/>
               </a:ext>
             </a:extLst>
           </p:spPr>

</xml_diff>